<commit_message>
Struktur der Arbeit erstellt
</commit_message>
<xml_diff>
--- a/Projektmgmt/Bildanalyse Software_RogerBollmann.pptx
+++ b/Projektmgmt/Bildanalyse Software_RogerBollmann.pptx
@@ -3455,15 +3455,11 @@
             <a:pPr algn="l"/>
             <a:r>
               <a:rPr lang="en-US" dirty="0" err="1" smtClean="0"/>
-              <a:t>Beträuer</a:t>
+              <a:t>Betreuer</a:t>
             </a:r>
             <a:r>
               <a:rPr lang="en-US" dirty="0" smtClean="0"/>
-              <a:t>: </a:t>
-            </a:r>
-            <a:r>
-              <a:rPr lang="en-US" dirty="0" smtClean="0"/>
-              <a:t>Mathias Bachman</a:t>
+              <a:t>: Mathias Bachman</a:t>
             </a:r>
           </a:p>
           <a:p>
@@ -3587,18 +3583,12 @@
               <a:rPr lang="de-CH" dirty="0" smtClean="0"/>
               <a:t>Grobplanung</a:t>
             </a:r>
-            <a:endParaRPr lang="de-CH" dirty="0" smtClean="0"/>
           </a:p>
           <a:p>
             <a:r>
               <a:rPr lang="de-CH" dirty="0" smtClean="0"/>
-              <a:t>Erwartete </a:t>
-            </a:r>
-            <a:r>
-              <a:rPr lang="de-CH" dirty="0" smtClean="0"/>
-              <a:t>Resultate</a:t>
-            </a:r>
-            <a:endParaRPr lang="de-CH" dirty="0" smtClean="0"/>
+              <a:t>Erwartete Resultate</a:t>
+            </a:r>
           </a:p>
         </p:txBody>
       </p:sp>

</xml_diff>